<commit_message>
Added a Map plot using plotly and trained various models on the dataset
</commit_message>
<xml_diff>
--- a/ML Pjct.pptx
+++ b/ML Pjct.pptx
@@ -111,6 +111,11 @@
       </a:defRPr>
     </a:lvl9pPr>
   </p:defaultTextStyle>
+  <p:extLst>
+    <p:ext uri="{EFAFB233-063F-42B5-8137-9DF3F51BA10A}">
+      <p15:sldGuideLst xmlns:p15="http://schemas.microsoft.com/office/powerpoint/2012/main"/>
+    </p:ext>
+  </p:extLst>
 </p:presentation>
 </file>
 
@@ -836,7 +841,7 @@
           <a:p>
             <a:fld id="{2DB33218-488E-4588-8D6B-D86927D53DEF}" type="datetimeFigureOut">
               <a:rPr lang="en-US" smtClean="0"/>
-              <a:t>05-Mar-24</a:t>
+              <a:t>18-Apr-24</a:t>
             </a:fld>
             <a:endParaRPr lang="en-US"/>
           </a:p>
@@ -1087,7 +1092,7 @@
           <a:p>
             <a:fld id="{2DB33218-488E-4588-8D6B-D86927D53DEF}" type="datetimeFigureOut">
               <a:rPr lang="en-US" smtClean="0"/>
-              <a:t>05-Mar-24</a:t>
+              <a:t>18-Apr-24</a:t>
             </a:fld>
             <a:endParaRPr lang="en-US"/>
           </a:p>
@@ -1401,7 +1406,7 @@
           <a:p>
             <a:fld id="{2DB33218-488E-4588-8D6B-D86927D53DEF}" type="datetimeFigureOut">
               <a:rPr lang="en-US" smtClean="0"/>
-              <a:t>05-Mar-24</a:t>
+              <a:t>18-Apr-24</a:t>
             </a:fld>
             <a:endParaRPr lang="en-US"/>
           </a:p>
@@ -1742,7 +1747,7 @@
           <a:p>
             <a:fld id="{2DB33218-488E-4588-8D6B-D86927D53DEF}" type="datetimeFigureOut">
               <a:rPr lang="en-US" smtClean="0"/>
-              <a:t>05-Mar-24</a:t>
+              <a:t>18-Apr-24</a:t>
             </a:fld>
             <a:endParaRPr lang="en-US"/>
           </a:p>
@@ -2056,7 +2061,7 @@
           <a:p>
             <a:fld id="{2DB33218-488E-4588-8D6B-D86927D53DEF}" type="datetimeFigureOut">
               <a:rPr lang="en-US" smtClean="0"/>
-              <a:t>05-Mar-24</a:t>
+              <a:t>18-Apr-24</a:t>
             </a:fld>
             <a:endParaRPr lang="en-US"/>
           </a:p>
@@ -2449,7 +2454,7 @@
           <a:p>
             <a:fld id="{2DB33218-488E-4588-8D6B-D86927D53DEF}" type="datetimeFigureOut">
               <a:rPr lang="en-US" smtClean="0"/>
-              <a:t>05-Mar-24</a:t>
+              <a:t>18-Apr-24</a:t>
             </a:fld>
             <a:endParaRPr lang="en-US"/>
           </a:p>
@@ -2619,7 +2624,7 @@
           <a:p>
             <a:fld id="{2DB33218-488E-4588-8D6B-D86927D53DEF}" type="datetimeFigureOut">
               <a:rPr lang="en-US" smtClean="0"/>
-              <a:t>05-Mar-24</a:t>
+              <a:t>18-Apr-24</a:t>
             </a:fld>
             <a:endParaRPr lang="en-US"/>
           </a:p>
@@ -2799,7 +2804,7 @@
           <a:p>
             <a:fld id="{2DB33218-488E-4588-8D6B-D86927D53DEF}" type="datetimeFigureOut">
               <a:rPr lang="en-US" smtClean="0"/>
-              <a:t>05-Mar-24</a:t>
+              <a:t>18-Apr-24</a:t>
             </a:fld>
             <a:endParaRPr lang="en-US"/>
           </a:p>
@@ -2975,7 +2980,7 @@
           <a:p>
             <a:fld id="{2DB33218-488E-4588-8D6B-D86927D53DEF}" type="datetimeFigureOut">
               <a:rPr lang="en-US" smtClean="0"/>
-              <a:t>05-Mar-24</a:t>
+              <a:t>18-Apr-24</a:t>
             </a:fld>
             <a:endParaRPr lang="en-US"/>
           </a:p>
@@ -3222,7 +3227,7 @@
           <a:p>
             <a:fld id="{2DB33218-488E-4588-8D6B-D86927D53DEF}" type="datetimeFigureOut">
               <a:rPr lang="en-US" smtClean="0"/>
-              <a:t>05-Mar-24</a:t>
+              <a:t>18-Apr-24</a:t>
             </a:fld>
             <a:endParaRPr lang="en-US"/>
           </a:p>
@@ -3454,7 +3459,7 @@
           <a:p>
             <a:fld id="{2DB33218-488E-4588-8D6B-D86927D53DEF}" type="datetimeFigureOut">
               <a:rPr lang="en-US" smtClean="0"/>
-              <a:t>05-Mar-24</a:t>
+              <a:t>18-Apr-24</a:t>
             </a:fld>
             <a:endParaRPr lang="en-US"/>
           </a:p>
@@ -3828,7 +3833,7 @@
           <a:p>
             <a:fld id="{2DB33218-488E-4588-8D6B-D86927D53DEF}" type="datetimeFigureOut">
               <a:rPr lang="en-US" smtClean="0"/>
-              <a:t>05-Mar-24</a:t>
+              <a:t>18-Apr-24</a:t>
             </a:fld>
             <a:endParaRPr lang="en-US"/>
           </a:p>
@@ -3951,7 +3956,7 @@
           <a:p>
             <a:fld id="{2DB33218-488E-4588-8D6B-D86927D53DEF}" type="datetimeFigureOut">
               <a:rPr lang="en-US" smtClean="0"/>
-              <a:t>05-Mar-24</a:t>
+              <a:t>18-Apr-24</a:t>
             </a:fld>
             <a:endParaRPr lang="en-US"/>
           </a:p>
@@ -4046,7 +4051,7 @@
           <a:p>
             <a:fld id="{2DB33218-488E-4588-8D6B-D86927D53DEF}" type="datetimeFigureOut">
               <a:rPr lang="en-US" smtClean="0"/>
-              <a:t>05-Mar-24</a:t>
+              <a:t>18-Apr-24</a:t>
             </a:fld>
             <a:endParaRPr lang="en-US"/>
           </a:p>
@@ -4301,7 +4306,7 @@
           <a:p>
             <a:fld id="{2DB33218-488E-4588-8D6B-D86927D53DEF}" type="datetimeFigureOut">
               <a:rPr lang="en-US" smtClean="0"/>
-              <a:t>05-Mar-24</a:t>
+              <a:t>18-Apr-24</a:t>
             </a:fld>
             <a:endParaRPr lang="en-US"/>
           </a:p>
@@ -4564,7 +4569,7 @@
           <a:p>
             <a:fld id="{2DB33218-488E-4588-8D6B-D86927D53DEF}" type="datetimeFigureOut">
               <a:rPr lang="en-US" smtClean="0"/>
-              <a:t>05-Mar-24</a:t>
+              <a:t>18-Apr-24</a:t>
             </a:fld>
             <a:endParaRPr lang="en-US"/>
           </a:p>
@@ -5307,7 +5312,7 @@
           <a:p>
             <a:fld id="{2DB33218-488E-4588-8D6B-D86927D53DEF}" type="datetimeFigureOut">
               <a:rPr lang="en-US" smtClean="0"/>
-              <a:t>05-Mar-24</a:t>
+              <a:t>18-Apr-24</a:t>
             </a:fld>
             <a:endParaRPr lang="en-US"/>
           </a:p>
@@ -5844,15 +5849,15 @@
         <p:spPr/>
         <p:txBody>
           <a:bodyPr>
-            <a:normAutofit fontScale="90000"/>
+            <a:noAutofit/>
           </a:bodyPr>
           <a:lstStyle/>
           <a:p>
             <a:r>
-              <a:rPr lang="en-US" dirty="0" smtClean="0"/>
-              <a:t>MACHINE LEARNIG BASED  MODEL FOR RAINFALL PREDICTION IN UGANDA</a:t>
-            </a:r>
-            <a:endParaRPr lang="en-US" dirty="0"/>
+              <a:rPr lang="en-US" sz="4000" dirty="0" smtClean="0"/>
+              <a:t>COMPARING THE PERFORMANCE OF REGRESSION MACHINE LEARNING ALGORITHMS IN PREDICTING RAINFALL IN UGANDA </a:t>
+            </a:r>
+            <a:endParaRPr lang="en-US" sz="4000" dirty="0"/>
           </a:p>
         </p:txBody>
       </p:sp>

</xml_diff>